<commit_message>
best tuned MPC so far
</commit_message>
<xml_diff>
--- a/Figures/schematic.pptx
+++ b/Figures/schematic.pptx
@@ -3329,10 +3329,10 @@
       </p:grpSpPr>
       <p:grpSp>
         <p:nvGrpSpPr>
-          <p:cNvPr id="1124" name="Group 1123">
+          <p:cNvPr id="7" name="Group 6">
             <a:extLst>
               <a:ext uri="{FF2B5EF4-FFF2-40B4-BE49-F238E27FC236}">
-                <a16:creationId xmlns:a16="http://schemas.microsoft.com/office/drawing/2014/main" id="{F16D0B94-7374-BED7-B069-6D9CECA3E575}"/>
+                <a16:creationId xmlns:a16="http://schemas.microsoft.com/office/drawing/2014/main" id="{1F5DDA07-4388-698A-8EB1-DA48DE74C7D3}"/>
               </a:ext>
             </a:extLst>
           </p:cNvPr>
@@ -3341,10 +3341,10 @@
         </p:nvGrpSpPr>
         <p:grpSpPr>
           <a:xfrm>
-            <a:off x="2649361" y="657423"/>
-            <a:ext cx="5831548" cy="4939399"/>
-            <a:chOff x="2649361" y="657423"/>
-            <a:chExt cx="5831548" cy="4939399"/>
+            <a:off x="2649361" y="632361"/>
+            <a:ext cx="5458569" cy="4872128"/>
+            <a:chOff x="2649361" y="632361"/>
+            <a:chExt cx="5458569" cy="4872128"/>
           </a:xfrm>
         </p:grpSpPr>
         <p:sp>
@@ -3361,7 +3361,7 @@
           </p:nvSpPr>
           <p:spPr>
             <a:xfrm rot="19821739">
-              <a:off x="6978674" y="1278677"/>
+              <a:off x="6605695" y="1253615"/>
               <a:ext cx="1082842" cy="730183"/>
             </a:xfrm>
             <a:prstGeom prst="ellipse">
@@ -3415,7 +3415,7 @@
           </p:nvSpPr>
           <p:spPr>
             <a:xfrm rot="19821739">
-              <a:off x="4636124" y="4171105"/>
+              <a:off x="4263145" y="4146043"/>
               <a:ext cx="1082842" cy="771866"/>
             </a:xfrm>
             <a:prstGeom prst="ellipse">
@@ -3471,7 +3471,7 @@
           </p:nvCxnSpPr>
           <p:spPr>
             <a:xfrm rot="19821739" flipH="1">
-              <a:off x="4627714" y="2404767"/>
+              <a:off x="4254735" y="2379705"/>
               <a:ext cx="3455511" cy="1371746"/>
             </a:xfrm>
             <a:prstGeom prst="line">
@@ -3516,7 +3516,7 @@
           </p:nvGrpSpPr>
           <p:grpSpPr>
             <a:xfrm rot="21370826">
-              <a:off x="6986578" y="1286970"/>
+              <a:off x="6613599" y="1261908"/>
               <a:ext cx="1099796" cy="680248"/>
               <a:chOff x="5429395" y="1772854"/>
               <a:chExt cx="1099796" cy="680248"/>
@@ -4097,7 +4097,7 @@
           </p:nvGrpSpPr>
           <p:grpSpPr>
             <a:xfrm rot="21370826">
-              <a:off x="4623436" y="4209514"/>
+              <a:off x="4250457" y="4184452"/>
               <a:ext cx="1099796" cy="680248"/>
               <a:chOff x="5429395" y="1772854"/>
               <a:chExt cx="1099796" cy="680248"/>
@@ -4678,7 +4678,7 @@
           </p:nvSpPr>
           <p:spPr>
             <a:xfrm rot="19821739">
-              <a:off x="7479500" y="1566854"/>
+              <a:off x="7106521" y="1541792"/>
               <a:ext cx="109890" cy="109890"/>
             </a:xfrm>
             <a:prstGeom prst="ellipse">
@@ -4729,7 +4729,7 @@
           </p:nvSpPr>
           <p:spPr>
             <a:xfrm rot="19821739">
-              <a:off x="5126061" y="4493018"/>
+              <a:off x="4753082" y="4467956"/>
               <a:ext cx="109890" cy="109890"/>
             </a:xfrm>
             <a:prstGeom prst="ellipse">
@@ -4766,8 +4766,8 @@
             </a:p>
           </p:txBody>
         </p:sp>
-        <mc:AlternateContent xmlns:mc="http://schemas.openxmlformats.org/markup-compatibility/2006" xmlns:a14="http://schemas.microsoft.com/office/drawing/2010/main">
-          <mc:Choice Requires="a14">
+        <mc:AlternateContent xmlns:mc="http://schemas.openxmlformats.org/markup-compatibility/2006">
+          <mc:Choice xmlns:a14="http://schemas.microsoft.com/office/drawing/2010/main" Requires="a14">
             <p:sp>
               <p:nvSpPr>
                 <p:cNvPr id="60" name="TextBox 59">
@@ -4782,7 +4782,7 @@
               </p:nvSpPr>
               <p:spPr>
                 <a:xfrm rot="221500">
-                  <a:off x="6989743" y="657423"/>
+                  <a:off x="6616764" y="632361"/>
                   <a:ext cx="250838" cy="276999"/>
                 </a:xfrm>
                 <a:prstGeom prst="rect">
@@ -4836,7 +4836,7 @@
               </p:txBody>
             </p:sp>
           </mc:Choice>
-          <mc:Fallback xmlns="">
+          <mc:Fallback>
             <p:sp>
               <p:nvSpPr>
                 <p:cNvPr id="60" name="TextBox 59">
@@ -4853,7 +4853,7 @@
               </p:nvSpPr>
               <p:spPr>
                 <a:xfrm rot="221500">
-                  <a:off x="6989743" y="657423"/>
+                  <a:off x="6616764" y="632361"/>
                   <a:ext cx="250838" cy="276999"/>
                 </a:xfrm>
                 <a:prstGeom prst="rect">
@@ -4862,7 +4862,7 @@
                 <a:blipFill>
                   <a:blip r:embed="rId2"/>
                   <a:stretch>
-                    <a:fillRect l="-33333" t="-4082" r="-2222" b="-30612"/>
+                    <a:fillRect l="-34091" t="-4082" r="-4545" b="-30612"/>
                   </a:stretch>
                 </a:blipFill>
               </p:spPr>
@@ -4895,7 +4895,7 @@
           </p:nvSpPr>
           <p:spPr>
             <a:xfrm rot="19821739">
-              <a:off x="4620105" y="2263298"/>
+              <a:off x="4247126" y="2238236"/>
               <a:ext cx="1141444" cy="785991"/>
             </a:xfrm>
             <a:prstGeom prst="ellipse">
@@ -4949,7 +4949,7 @@
           </p:nvSpPr>
           <p:spPr>
             <a:xfrm rot="19821739">
-              <a:off x="7398067" y="3048631"/>
+              <a:off x="7025088" y="3023569"/>
               <a:ext cx="1082842" cy="870996"/>
             </a:xfrm>
             <a:prstGeom prst="ellipse">
@@ -5005,7 +5005,7 @@
           </p:nvCxnSpPr>
           <p:spPr>
             <a:xfrm rot="19821739">
-              <a:off x="5572015" y="2039981"/>
+              <a:off x="5199036" y="2014919"/>
               <a:ext cx="2009032" cy="2073725"/>
             </a:xfrm>
             <a:prstGeom prst="line">
@@ -5050,7 +5050,7 @@
           </p:nvGrpSpPr>
           <p:grpSpPr>
             <a:xfrm rot="17045795">
-              <a:off x="4659148" y="2381087"/>
+              <a:off x="4286169" y="2356025"/>
               <a:ext cx="1066203" cy="588326"/>
               <a:chOff x="2892172" y="1580012"/>
               <a:chExt cx="1066203" cy="588326"/>
@@ -5631,7 +5631,7 @@
           </p:nvGrpSpPr>
           <p:grpSpPr>
             <a:xfrm rot="4400712">
-              <a:off x="7383999" y="3119305"/>
+              <a:off x="7011020" y="3094243"/>
               <a:ext cx="1099796" cy="680248"/>
               <a:chOff x="5429395" y="1772854"/>
               <a:chExt cx="1099796" cy="680248"/>
@@ -6212,7 +6212,7 @@
           </p:nvSpPr>
           <p:spPr>
             <a:xfrm rot="19821739">
-              <a:off x="7879786" y="3401455"/>
+              <a:off x="7506807" y="3376393"/>
               <a:ext cx="109890" cy="109890"/>
             </a:xfrm>
             <a:prstGeom prst="ellipse">
@@ -6263,7 +6263,7 @@
           </p:nvSpPr>
           <p:spPr>
             <a:xfrm rot="19821739">
-              <a:off x="5135541" y="2630378"/>
+              <a:off x="4762562" y="2605316"/>
               <a:ext cx="109890" cy="109890"/>
             </a:xfrm>
             <a:prstGeom prst="ellipse">
@@ -6316,7 +6316,7 @@
           </p:nvCxnSpPr>
           <p:spPr>
             <a:xfrm flipH="1" flipV="1">
-              <a:off x="4967282" y="1867193"/>
+              <a:off x="4594303" y="1842131"/>
               <a:ext cx="223991" cy="824785"/>
             </a:xfrm>
             <a:prstGeom prst="straightConnector1">
@@ -6344,8 +6344,8 @@
             </a:fontRef>
           </p:style>
         </p:cxnSp>
-        <mc:AlternateContent xmlns:mc="http://schemas.openxmlformats.org/markup-compatibility/2006" xmlns:a14="http://schemas.microsoft.com/office/drawing/2010/main">
-          <mc:Choice Requires="a14">
+        <mc:AlternateContent xmlns:mc="http://schemas.openxmlformats.org/markup-compatibility/2006">
+          <mc:Choice xmlns:a14="http://schemas.microsoft.com/office/drawing/2010/main" Requires="a14">
             <p:sp>
               <p:nvSpPr>
                 <p:cNvPr id="59" name="TextBox 58">
@@ -6360,7 +6360,7 @@
               </p:nvSpPr>
               <p:spPr>
                 <a:xfrm>
-                  <a:off x="4599559" y="1659290"/>
+                  <a:off x="4226580" y="1634228"/>
                   <a:ext cx="245515" cy="276999"/>
                 </a:xfrm>
                 <a:prstGeom prst="rect">
@@ -6414,7 +6414,7 @@
               </p:txBody>
             </p:sp>
           </mc:Choice>
-          <mc:Fallback xmlns="">
+          <mc:Fallback>
             <p:sp>
               <p:nvSpPr>
                 <p:cNvPr id="59" name="TextBox 58">
@@ -6431,7 +6431,7 @@
               </p:nvSpPr>
               <p:spPr>
                 <a:xfrm>
-                  <a:off x="4599559" y="1659290"/>
+                  <a:off x="4226580" y="1634228"/>
                   <a:ext cx="245515" cy="276999"/>
                 </a:xfrm>
                 <a:prstGeom prst="rect">
@@ -6440,7 +6440,7 @@
                 <a:blipFill>
                   <a:blip r:embed="rId3"/>
                   <a:stretch>
-                    <a:fillRect l="-35000" t="-2174" r="-7500" b="-32609"/>
+                    <a:fillRect l="-34146" t="-2174" r="-7317" b="-32609"/>
                   </a:stretch>
                 </a:blipFill>
               </p:spPr>
@@ -6459,8 +6459,8 @@
             </p:sp>
           </mc:Fallback>
         </mc:AlternateContent>
-        <mc:AlternateContent xmlns:mc="http://schemas.openxmlformats.org/markup-compatibility/2006" xmlns:a14="http://schemas.microsoft.com/office/drawing/2010/main">
-          <mc:Choice Requires="a14">
+        <mc:AlternateContent xmlns:mc="http://schemas.openxmlformats.org/markup-compatibility/2006">
+          <mc:Choice xmlns:a14="http://schemas.microsoft.com/office/drawing/2010/main" Requires="a14">
             <p:sp>
               <p:nvSpPr>
                 <p:cNvPr id="61" name="TextBox 60">
@@ -6475,7 +6475,7 @@
               </p:nvSpPr>
               <p:spPr>
                 <a:xfrm>
-                  <a:off x="7404170" y="2462505"/>
+                  <a:off x="7031191" y="2437443"/>
                   <a:ext cx="250838" cy="276999"/>
                 </a:xfrm>
                 <a:prstGeom prst="rect">
@@ -6529,7 +6529,7 @@
               </p:txBody>
             </p:sp>
           </mc:Choice>
-          <mc:Fallback xmlns="">
+          <mc:Fallback>
             <p:sp>
               <p:nvSpPr>
                 <p:cNvPr id="61" name="TextBox 60">
@@ -6546,7 +6546,7 @@
               </p:nvSpPr>
               <p:spPr>
                 <a:xfrm>
-                  <a:off x="7404170" y="2462505"/>
+                  <a:off x="7031191" y="2437443"/>
                   <a:ext cx="250838" cy="276999"/>
                 </a:xfrm>
                 <a:prstGeom prst="rect">
@@ -6555,7 +6555,7 @@
                 <a:blipFill>
                   <a:blip r:embed="rId4"/>
                   <a:stretch>
-                    <a:fillRect l="-34146" t="-2222" r="-7317" b="-35556"/>
+                    <a:fillRect l="-33333" t="-2222" r="-7143" b="-35556"/>
                   </a:stretch>
                 </a:blipFill>
               </p:spPr>
@@ -6574,8 +6574,8 @@
             </p:sp>
           </mc:Fallback>
         </mc:AlternateContent>
-        <mc:AlternateContent xmlns:mc="http://schemas.openxmlformats.org/markup-compatibility/2006" xmlns:a14="http://schemas.microsoft.com/office/drawing/2010/main">
-          <mc:Choice Requires="a14">
+        <mc:AlternateContent xmlns:mc="http://schemas.openxmlformats.org/markup-compatibility/2006">
+          <mc:Choice xmlns:a14="http://schemas.microsoft.com/office/drawing/2010/main" Requires="a14">
             <p:sp>
               <p:nvSpPr>
                 <p:cNvPr id="62" name="TextBox 61">
@@ -6590,7 +6590,7 @@
               </p:nvSpPr>
               <p:spPr>
                 <a:xfrm>
-                  <a:off x="4630152" y="3555978"/>
+                  <a:off x="4257173" y="3530916"/>
                   <a:ext cx="241796" cy="276999"/>
                 </a:xfrm>
                 <a:prstGeom prst="rect">
@@ -6644,7 +6644,7 @@
               </p:txBody>
             </p:sp>
           </mc:Choice>
-          <mc:Fallback xmlns="">
+          <mc:Fallback>
             <p:sp>
               <p:nvSpPr>
                 <p:cNvPr id="62" name="TextBox 61">
@@ -6661,7 +6661,7 @@
               </p:nvSpPr>
               <p:spPr>
                 <a:xfrm>
-                  <a:off x="4630152" y="3555978"/>
+                  <a:off x="4257173" y="3530916"/>
                   <a:ext cx="241796" cy="276999"/>
                 </a:xfrm>
                 <a:prstGeom prst="rect">
@@ -6670,7 +6670,7 @@
                 <a:blipFill>
                   <a:blip r:embed="rId5"/>
                   <a:stretch>
-                    <a:fillRect l="-35897" t="-2174" r="-10256" b="-32609"/>
+                    <a:fillRect l="-35000" t="-2174" r="-10000" b="-32609"/>
                   </a:stretch>
                 </a:blipFill>
               </p:spPr>
@@ -6705,7 +6705,7 @@
           </p:nvCxnSpPr>
           <p:spPr>
             <a:xfrm flipH="1" flipV="1">
-              <a:off x="7308494" y="795923"/>
+              <a:off x="6935515" y="770861"/>
               <a:ext cx="223991" cy="824785"/>
             </a:xfrm>
             <a:prstGeom prst="straightConnector1">
@@ -6749,7 +6749,7 @@
           </p:nvCxnSpPr>
           <p:spPr>
             <a:xfrm flipH="1" flipV="1">
-              <a:off x="7704207" y="2631615"/>
+              <a:off x="7331228" y="2606553"/>
               <a:ext cx="223991" cy="824785"/>
             </a:xfrm>
             <a:prstGeom prst="straightConnector1">
@@ -6793,7 +6793,7 @@
           </p:nvCxnSpPr>
           <p:spPr>
             <a:xfrm flipH="1" flipV="1">
-              <a:off x="4950680" y="3716763"/>
+              <a:off x="4577701" y="3691701"/>
               <a:ext cx="223991" cy="824785"/>
             </a:xfrm>
             <a:prstGeom prst="straightConnector1">
@@ -6835,7 +6835,7 @@
           </p:nvSpPr>
           <p:spPr>
             <a:xfrm rot="20408256">
-              <a:off x="6043724" y="2574938"/>
+              <a:off x="5670745" y="2549876"/>
               <a:ext cx="713745" cy="916772"/>
             </a:xfrm>
             <a:prstGeom prst="roundRect">
@@ -6886,7 +6886,7 @@
           </p:nvCxnSpPr>
           <p:spPr>
             <a:xfrm flipH="1" flipV="1">
-              <a:off x="6222189" y="2346950"/>
+              <a:off x="5849210" y="2321888"/>
               <a:ext cx="186275" cy="666446"/>
             </a:xfrm>
             <a:prstGeom prst="straightConnector1">
@@ -6930,7 +6930,7 @@
           </p:nvCxnSpPr>
           <p:spPr>
             <a:xfrm flipV="1">
-              <a:off x="6400102" y="2540190"/>
+              <a:off x="6027123" y="2515128"/>
               <a:ext cx="403746" cy="469510"/>
             </a:xfrm>
             <a:prstGeom prst="straightConnector1">
@@ -6974,7 +6974,7 @@
           </p:nvCxnSpPr>
           <p:spPr>
             <a:xfrm>
-              <a:off x="6399535" y="3002032"/>
+              <a:off x="6026556" y="2976970"/>
               <a:ext cx="573003" cy="182493"/>
             </a:xfrm>
             <a:prstGeom prst="straightConnector1">
@@ -7016,8 +7016,8 @@
           </p:nvSpPr>
           <p:spPr>
             <a:xfrm>
-              <a:off x="5502326" y="2960449"/>
-              <a:ext cx="556243" cy="461665"/>
+              <a:off x="5195282" y="2982862"/>
+              <a:ext cx="444032" cy="369332"/>
             </a:xfrm>
             <a:prstGeom prst="rect">
               <a:avLst/>
@@ -7030,21 +7030,22 @@
             </a:bodyPr>
             <a:lstStyle/>
             <a:p>
+              <a:pPr algn="ctr"/>
               <a:r>
-                <a:rPr lang="en-US" sz="1500" dirty="0">
+                <a:rPr lang="en-US" sz="1200" dirty="0">
                   <a:latin typeface="Arial" panose="020B0604020202020204" pitchFamily="34" charset="0"/>
                   <a:cs typeface="Arial" panose="020B0604020202020204" pitchFamily="34" charset="0"/>
                 </a:rPr>
                 <a:t>Body </a:t>
               </a:r>
               <a:br>
-                <a:rPr lang="en-US" sz="1500" dirty="0">
+                <a:rPr lang="en-US" sz="1200" dirty="0">
                   <a:latin typeface="Arial" panose="020B0604020202020204" pitchFamily="34" charset="0"/>
                   <a:cs typeface="Arial" panose="020B0604020202020204" pitchFamily="34" charset="0"/>
                 </a:rPr>
               </a:br>
               <a:r>
-                <a:rPr lang="en-US" sz="1500" dirty="0">
+                <a:rPr lang="en-US" sz="1200" dirty="0">
                   <a:latin typeface="Arial" panose="020B0604020202020204" pitchFamily="34" charset="0"/>
                   <a:cs typeface="Arial" panose="020B0604020202020204" pitchFamily="34" charset="0"/>
                 </a:rPr>
@@ -7053,8 +7054,8 @@
             </a:p>
           </p:txBody>
         </p:sp>
-        <mc:AlternateContent xmlns:mc="http://schemas.openxmlformats.org/markup-compatibility/2006" xmlns:a14="http://schemas.microsoft.com/office/drawing/2010/main">
-          <mc:Choice Requires="a14">
+        <mc:AlternateContent xmlns:mc="http://schemas.openxmlformats.org/markup-compatibility/2006">
+          <mc:Choice xmlns:a14="http://schemas.microsoft.com/office/drawing/2010/main" Requires="a14">
             <p:sp>
               <p:nvSpPr>
                 <p:cNvPr id="1116" name="TextBox 1115">
@@ -7069,7 +7070,7 @@
               </p:nvSpPr>
               <p:spPr>
                 <a:xfrm>
-                  <a:off x="6035439" y="2905507"/>
+                  <a:off x="5662460" y="2880445"/>
                   <a:ext cx="373499" cy="276999"/>
                 </a:xfrm>
                 <a:prstGeom prst="rect">
@@ -7119,7 +7120,7 @@
               </p:txBody>
             </p:sp>
           </mc:Choice>
-          <mc:Fallback xmlns="">
+          <mc:Fallback>
             <p:sp>
               <p:nvSpPr>
                 <p:cNvPr id="1116" name="TextBox 1115">
@@ -7136,7 +7137,7 @@
               </p:nvSpPr>
               <p:spPr>
                 <a:xfrm>
-                  <a:off x="6035439" y="2905507"/>
+                  <a:off x="5662460" y="2880445"/>
                   <a:ext cx="373499" cy="276999"/>
                 </a:xfrm>
                 <a:prstGeom prst="rect">
@@ -7145,7 +7146,7 @@
                 <a:blipFill>
                   <a:blip r:embed="rId6"/>
                   <a:stretch>
-                    <a:fillRect l="-21311" t="-4444" r="-26230" b="-37778"/>
+                    <a:fillRect l="-22951" t="-4444" r="-24590" b="-37778"/>
                   </a:stretch>
                 </a:blipFill>
               </p:spPr>
@@ -7179,9 +7180,9 @@
           <p:grpSpPr>
             <a:xfrm>
               <a:off x="2649361" y="4365920"/>
-              <a:ext cx="1305817" cy="1230902"/>
+              <a:ext cx="1177577" cy="1138569"/>
               <a:chOff x="1581208" y="5320225"/>
-              <a:chExt cx="1305817" cy="1230902"/>
+              <a:chExt cx="1177577" cy="1138569"/>
             </a:xfrm>
           </p:grpSpPr>
           <p:grpSp>
@@ -7373,7 +7374,7 @@
             <p:spPr>
               <a:xfrm>
                 <a:off x="2255442" y="6089462"/>
-                <a:ext cx="631583" cy="461665"/>
+                <a:ext cx="503343" cy="369332"/>
               </a:xfrm>
               <a:prstGeom prst="rect">
                 <a:avLst/>
@@ -7386,21 +7387,22 @@
               </a:bodyPr>
               <a:lstStyle/>
               <a:p>
+                <a:pPr algn="ctr"/>
                 <a:r>
-                  <a:rPr lang="en-US" sz="1500" dirty="0">
+                  <a:rPr lang="en-US" sz="1200" dirty="0">
                     <a:latin typeface="Arial" panose="020B0604020202020204" pitchFamily="34" charset="0"/>
                     <a:cs typeface="Arial" panose="020B0604020202020204" pitchFamily="34" charset="0"/>
                   </a:rPr>
                   <a:t>Inertial </a:t>
                 </a:r>
                 <a:br>
-                  <a:rPr lang="en-US" sz="1500" dirty="0">
+                  <a:rPr lang="en-US" sz="1200" dirty="0">
                     <a:latin typeface="Arial" panose="020B0604020202020204" pitchFamily="34" charset="0"/>
                     <a:cs typeface="Arial" panose="020B0604020202020204" pitchFamily="34" charset="0"/>
                   </a:rPr>
                 </a:br>
                 <a:r>
-                  <a:rPr lang="en-US" sz="1500" dirty="0">
+                  <a:rPr lang="en-US" sz="1200" dirty="0">
                     <a:latin typeface="Arial" panose="020B0604020202020204" pitchFamily="34" charset="0"/>
                     <a:cs typeface="Arial" panose="020B0604020202020204" pitchFamily="34" charset="0"/>
                   </a:rPr>
@@ -7521,6 +7523,198 @@
             </mc:Fallback>
           </mc:AlternateContent>
         </p:grpSp>
+        <mc:AlternateContent xmlns:mc="http://schemas.openxmlformats.org/markup-compatibility/2006">
+          <mc:Choice xmlns:a14="http://schemas.microsoft.com/office/drawing/2010/main" Requires="a14">
+            <p:sp>
+              <p:nvSpPr>
+                <p:cNvPr id="2" name="TextBox 1">
+                  <a:extLst>
+                    <a:ext uri="{FF2B5EF4-FFF2-40B4-BE49-F238E27FC236}">
+                      <a16:creationId xmlns:a16="http://schemas.microsoft.com/office/drawing/2014/main" id="{582485C2-011E-27B9-5261-FD508E527688}"/>
+                    </a:ext>
+                  </a:extLst>
+                </p:cNvPr>
+                <p:cNvSpPr txBox="1"/>
+                <p:nvPr/>
+              </p:nvSpPr>
+              <p:spPr>
+                <a:xfrm>
+                  <a:off x="5152479" y="3591355"/>
+                  <a:ext cx="193258" cy="276999"/>
+                </a:xfrm>
+                <a:prstGeom prst="rect">
+                  <a:avLst/>
+                </a:prstGeom>
+                <a:noFill/>
+              </p:spPr>
+              <p:txBody>
+                <a:bodyPr wrap="none" lIns="0" tIns="0" rIns="0" bIns="0" rtlCol="0">
+                  <a:spAutoFit/>
+                </a:bodyPr>
+                <a:lstStyle/>
+                <a:p>
+                  <a:pPr/>
+                  <a14:m>
+                    <m:oMathPara xmlns:m="http://schemas.openxmlformats.org/officeDocument/2006/math">
+                      <m:oMathParaPr>
+                        <m:jc m:val="centerGroup"/>
+                      </m:oMathParaPr>
+                      <m:oMath xmlns:m="http://schemas.openxmlformats.org/officeDocument/2006/math">
+                        <m:r>
+                          <a:rPr lang="en-US" b="0" i="1" smtClean="0">
+                            <a:latin typeface="Cambria Math" panose="02040503050406030204" pitchFamily="18" charset="0"/>
+                          </a:rPr>
+                          <m:t>𝑑</m:t>
+                        </m:r>
+                      </m:oMath>
+                    </m:oMathPara>
+                  </a14:m>
+                  <a:endParaRPr lang="en-US" dirty="0"/>
+                </a:p>
+              </p:txBody>
+            </p:sp>
+          </mc:Choice>
+          <mc:Fallback>
+            <p:sp>
+              <p:nvSpPr>
+                <p:cNvPr id="2" name="TextBox 1">
+                  <a:extLst>
+                    <a:ext uri="{FF2B5EF4-FFF2-40B4-BE49-F238E27FC236}">
+                      <a16:creationId xmlns:a16="http://schemas.microsoft.com/office/drawing/2014/main" id="{582485C2-011E-27B9-5261-FD508E527688}"/>
+                    </a:ext>
+                  </a:extLst>
+                </p:cNvPr>
+                <p:cNvSpPr txBox="1">
+                  <a:spLocks noRot="1" noChangeAspect="1" noMove="1" noResize="1" noEditPoints="1" noAdjustHandles="1" noChangeArrowheads="1" noChangeShapeType="1" noTextEdit="1"/>
+                </p:cNvSpPr>
+                <p:nvPr/>
+              </p:nvSpPr>
+              <p:spPr>
+                <a:xfrm>
+                  <a:off x="5152479" y="3591355"/>
+                  <a:ext cx="193258" cy="276999"/>
+                </a:xfrm>
+                <a:prstGeom prst="rect">
+                  <a:avLst/>
+                </a:prstGeom>
+                <a:blipFill>
+                  <a:blip r:embed="rId8"/>
+                  <a:stretch>
+                    <a:fillRect l="-31250" r="-25000" b="-6522"/>
+                  </a:stretch>
+                </a:blipFill>
+              </p:spPr>
+              <p:txBody>
+                <a:bodyPr/>
+                <a:lstStyle/>
+                <a:p>
+                  <a:r>
+                    <a:rPr lang="en-US">
+                      <a:noFill/>
+                    </a:rPr>
+                    <a:t> </a:t>
+                  </a:r>
+                </a:p>
+              </p:txBody>
+            </p:sp>
+          </mc:Fallback>
+        </mc:AlternateContent>
+        <mc:AlternateContent xmlns:mc="http://schemas.openxmlformats.org/markup-compatibility/2006">
+          <mc:Choice xmlns:a14="http://schemas.microsoft.com/office/drawing/2010/main" Requires="a14">
+            <p:sp>
+              <p:nvSpPr>
+                <p:cNvPr id="5" name="TextBox 4">
+                  <a:extLst>
+                    <a:ext uri="{FF2B5EF4-FFF2-40B4-BE49-F238E27FC236}">
+                      <a16:creationId xmlns:a16="http://schemas.microsoft.com/office/drawing/2014/main" id="{1058BD9C-A774-E76F-FA26-5974A710E3EC}"/>
+                    </a:ext>
+                  </a:extLst>
+                </p:cNvPr>
+                <p:cNvSpPr txBox="1"/>
+                <p:nvPr/>
+              </p:nvSpPr>
+              <p:spPr>
+                <a:xfrm>
+                  <a:off x="6756747" y="2926516"/>
+                  <a:ext cx="193258" cy="276999"/>
+                </a:xfrm>
+                <a:prstGeom prst="rect">
+                  <a:avLst/>
+                </a:prstGeom>
+                <a:noFill/>
+              </p:spPr>
+              <p:txBody>
+                <a:bodyPr wrap="none" lIns="0" tIns="0" rIns="0" bIns="0" rtlCol="0">
+                  <a:spAutoFit/>
+                </a:bodyPr>
+                <a:lstStyle/>
+                <a:p>
+                  <a:pPr/>
+                  <a14:m>
+                    <m:oMathPara xmlns:m="http://schemas.openxmlformats.org/officeDocument/2006/math">
+                      <m:oMathParaPr>
+                        <m:jc m:val="centerGroup"/>
+                      </m:oMathParaPr>
+                      <m:oMath xmlns:m="http://schemas.openxmlformats.org/officeDocument/2006/math">
+                        <m:r>
+                          <a:rPr lang="en-US" b="0" i="1" smtClean="0">
+                            <a:latin typeface="Cambria Math" panose="02040503050406030204" pitchFamily="18" charset="0"/>
+                          </a:rPr>
+                          <m:t>𝑑</m:t>
+                        </m:r>
+                      </m:oMath>
+                    </m:oMathPara>
+                  </a14:m>
+                  <a:endParaRPr lang="en-US" dirty="0"/>
+                </a:p>
+              </p:txBody>
+            </p:sp>
+          </mc:Choice>
+          <mc:Fallback>
+            <p:sp>
+              <p:nvSpPr>
+                <p:cNvPr id="5" name="TextBox 4">
+                  <a:extLst>
+                    <a:ext uri="{FF2B5EF4-FFF2-40B4-BE49-F238E27FC236}">
+                      <a16:creationId xmlns:a16="http://schemas.microsoft.com/office/drawing/2014/main" id="{1058BD9C-A774-E76F-FA26-5974A710E3EC}"/>
+                    </a:ext>
+                  </a:extLst>
+                </p:cNvPr>
+                <p:cNvSpPr txBox="1">
+                  <a:spLocks noRot="1" noChangeAspect="1" noMove="1" noResize="1" noEditPoints="1" noAdjustHandles="1" noChangeArrowheads="1" noChangeShapeType="1" noTextEdit="1"/>
+                </p:cNvSpPr>
+                <p:nvPr/>
+              </p:nvSpPr>
+              <p:spPr>
+                <a:xfrm>
+                  <a:off x="6756747" y="2926516"/>
+                  <a:ext cx="193258" cy="276999"/>
+                </a:xfrm>
+                <a:prstGeom prst="rect">
+                  <a:avLst/>
+                </a:prstGeom>
+                <a:blipFill>
+                  <a:blip r:embed="rId9"/>
+                  <a:stretch>
+                    <a:fillRect l="-31250" r="-25000" b="-6522"/>
+                  </a:stretch>
+                </a:blipFill>
+              </p:spPr>
+              <p:txBody>
+                <a:bodyPr/>
+                <a:lstStyle/>
+                <a:p>
+                  <a:r>
+                    <a:rPr lang="en-US">
+                      <a:noFill/>
+                    </a:rPr>
+                    <a:t> </a:t>
+                  </a:r>
+                </a:p>
+              </p:txBody>
+            </p:sp>
+          </mc:Fallback>
+        </mc:AlternateContent>
       </p:grpSp>
     </p:spTree>
     <p:extLst>

</xml_diff>